<commit_message>
Slides concering discussion about licence issues: Update
</commit_message>
<xml_diff>
--- a/arFramework3/Meeting Notes and Discussions/20201103-Copyright+LicenseDisucussion.pptx
+++ b/arFramework3/Meeting Notes and Discussions/20201103-Copyright+LicenseDisucussion.pptx
@@ -5,7 +5,7 @@
     <p:sldMasterId id="2147483656" r:id="rId1"/>
   </p:sldMasterIdLst>
   <p:notesMasterIdLst>
-    <p:notesMasterId r:id="rId9"/>
+    <p:notesMasterId r:id="rId11"/>
   </p:notesMasterIdLst>
   <p:sldIdLst>
     <p:sldId id="256" r:id="rId2"/>
@@ -13,8 +13,10 @@
     <p:sldId id="259" r:id="rId4"/>
     <p:sldId id="262" r:id="rId5"/>
     <p:sldId id="263" r:id="rId6"/>
-    <p:sldId id="260" r:id="rId7"/>
-    <p:sldId id="261" r:id="rId8"/>
+    <p:sldId id="264" r:id="rId7"/>
+    <p:sldId id="265" r:id="rId8"/>
+    <p:sldId id="260" r:id="rId9"/>
+    <p:sldId id="261" r:id="rId10"/>
   </p:sldIdLst>
   <p:sldSz cx="9144000" cy="6858000" type="screen4x3"/>
   <p:notesSz cx="6858000" cy="9144000"/>
@@ -123,6 +125,8 @@
             <p14:sldId id="259"/>
             <p14:sldId id="262"/>
             <p14:sldId id="263"/>
+            <p14:sldId id="264"/>
+            <p14:sldId id="265"/>
             <p14:sldId id="260"/>
             <p14:sldId id="261"/>
           </p14:sldIdLst>
@@ -4335,21 +4339,39 @@
           <a:lstStyle/>
           <a:p>
             <a:r>
-              <a:rPr lang="de-DE" dirty="0" err="1" smtClean="0"/>
-              <a:t>Example</a:t>
-            </a:r>
-            <a:r>
-              <a:rPr lang="de-DE" dirty="0"/>
-              <a:t> </a:t>
-            </a:r>
-            <a:r>
-              <a:rPr lang="de-DE" dirty="0" err="1" smtClean="0"/>
-              <a:t>models</a:t>
+              <a:rPr lang="de-DE" dirty="0" smtClean="0"/>
+              <a:t>KLU</a:t>
             </a:r>
             <a:endParaRPr lang="de-DE" dirty="0"/>
           </a:p>
         </p:txBody>
       </p:sp>
+      <p:pic>
+        <p:nvPicPr>
+          <p:cNvPr id="6" name="Inhaltsplatzhalter 5"/>
+          <p:cNvPicPr>
+            <a:picLocks noGrp="1" noChangeAspect="1"/>
+          </p:cNvPicPr>
+          <p:nvPr>
+            <p:ph idx="1"/>
+          </p:nvPr>
+        </p:nvPicPr>
+        <p:blipFill>
+          <a:blip r:embed="rId2"/>
+          <a:stretch>
+            <a:fillRect/>
+          </a:stretch>
+        </p:blipFill>
+        <p:spPr>
+          <a:xfrm>
+            <a:off x="570645" y="1494099"/>
+            <a:ext cx="5297219" cy="2455126"/>
+          </a:xfrm>
+          <a:prstGeom prst="rect">
+            <a:avLst/>
+          </a:prstGeom>
+        </p:spPr>
+      </p:pic>
       <p:sp>
         <p:nvSpPr>
           <p:cNvPr id="4" name="Textplatzhalter 3"/>
@@ -4365,15 +4387,7 @@
           <a:bodyPr/>
           <a:lstStyle/>
           <a:p>
-            <a:r>
-              <a:rPr lang="de-DE" dirty="0" smtClean="0"/>
-              <a:t>d2d\arFramework3\</a:t>
-            </a:r>
-            <a:r>
-              <a:rPr lang="de-DE" dirty="0" err="1" smtClean="0"/>
-              <a:t>Examples</a:t>
-            </a:r>
-            <a:endParaRPr lang="de-DE" dirty="0"/>
+            <a:endParaRPr lang="de-DE"/>
           </a:p>
         </p:txBody>
       </p:sp>
@@ -4420,32 +4434,7 @@
       </p:sp>
       <p:pic>
         <p:nvPicPr>
-          <p:cNvPr id="7" name="Inhaltsplatzhalter 6"/>
-          <p:cNvPicPr>
-            <a:picLocks noGrp="1" noChangeAspect="1"/>
-          </p:cNvPicPr>
-          <p:nvPr>
-            <p:ph idx="1"/>
-          </p:nvPr>
-        </p:nvPicPr>
-        <p:blipFill rotWithShape="1">
-          <a:blip r:embed="rId2"/>
-          <a:srcRect r="26176" b="15204"/>
-          <a:stretch/>
-        </p:blipFill>
-        <p:spPr>
-          <a:xfrm>
-            <a:off x="306000" y="1192214"/>
-            <a:ext cx="3854762" cy="4256480"/>
-          </a:xfrm>
-          <a:prstGeom prst="rect">
-            <a:avLst/>
-          </a:prstGeom>
-        </p:spPr>
-      </p:pic>
-      <p:pic>
-        <p:nvPicPr>
-          <p:cNvPr id="8" name="Grafik 7"/>
+          <p:cNvPr id="7" name="Grafik 6"/>
           <p:cNvPicPr>
             <a:picLocks noChangeAspect="1"/>
           </p:cNvPicPr>
@@ -4459,156 +4448,18 @@
         </p:blipFill>
         <p:spPr>
           <a:xfrm>
-            <a:off x="3771313" y="2934987"/>
-            <a:ext cx="5247350" cy="3373007"/>
+            <a:off x="3911904" y="2204512"/>
+            <a:ext cx="5053205" cy="3966690"/>
           </a:xfrm>
           <a:prstGeom prst="rect">
             <a:avLst/>
           </a:prstGeom>
         </p:spPr>
       </p:pic>
-      <p:pic>
-        <p:nvPicPr>
-          <p:cNvPr id="9" name="Grafik 8"/>
-          <p:cNvPicPr>
-            <a:picLocks noChangeAspect="1"/>
-          </p:cNvPicPr>
-          <p:nvPr/>
-        </p:nvPicPr>
-        <p:blipFill>
-          <a:blip r:embed="rId4"/>
-          <a:stretch>
-            <a:fillRect/>
-          </a:stretch>
-        </p:blipFill>
-        <p:spPr>
-          <a:xfrm>
-            <a:off x="4337282" y="139795"/>
-            <a:ext cx="4378616" cy="2425209"/>
-          </a:xfrm>
-          <a:prstGeom prst="rect">
-            <a:avLst/>
-          </a:prstGeom>
-          <a:ln>
-            <a:solidFill>
-              <a:schemeClr val="tx1">
-                <a:lumMod val="50000"/>
-              </a:schemeClr>
-            </a:solidFill>
-          </a:ln>
-        </p:spPr>
-      </p:pic>
-      <p:cxnSp>
-        <p:nvCxnSpPr>
-          <p:cNvPr id="11" name="Gerade Verbindung mit Pfeil 10"/>
-          <p:cNvCxnSpPr/>
-          <p:nvPr/>
-        </p:nvCxnSpPr>
-        <p:spPr>
-          <a:xfrm flipH="1">
-            <a:off x="2181981" y="1359505"/>
-            <a:ext cx="2155301" cy="1205499"/>
-          </a:xfrm>
-          <a:prstGeom prst="straightConnector1">
-            <a:avLst/>
-          </a:prstGeom>
-          <a:ln w="28575">
-            <a:solidFill>
-              <a:schemeClr val="tx1">
-                <a:lumMod val="50000"/>
-              </a:schemeClr>
-            </a:solidFill>
-            <a:tailEnd type="triangle"/>
-          </a:ln>
-        </p:spPr>
-        <p:style>
-          <a:lnRef idx="1">
-            <a:schemeClr val="accent1"/>
-          </a:lnRef>
-          <a:fillRef idx="0">
-            <a:schemeClr val="accent1"/>
-          </a:fillRef>
-          <a:effectRef idx="0">
-            <a:schemeClr val="accent1"/>
-          </a:effectRef>
-          <a:fontRef idx="minor">
-            <a:schemeClr val="tx1"/>
-          </a:fontRef>
-        </p:style>
-      </p:cxnSp>
-      <p:sp>
-        <p:nvSpPr>
-          <p:cNvPr id="12" name="Textfeld 11"/>
-          <p:cNvSpPr txBox="1"/>
-          <p:nvPr/>
-        </p:nvSpPr>
-        <p:spPr>
-          <a:xfrm>
-            <a:off x="304800" y="5583162"/>
-            <a:ext cx="2723823" cy="646331"/>
-          </a:xfrm>
-          <a:prstGeom prst="rect">
-            <a:avLst/>
-          </a:prstGeom>
-          <a:noFill/>
-        </p:spPr>
-        <p:txBody>
-          <a:bodyPr wrap="none" rtlCol="0">
-            <a:spAutoFit/>
-          </a:bodyPr>
-          <a:lstStyle/>
-          <a:p>
-            <a:r>
-              <a:rPr lang="de-DE" dirty="0" err="1" smtClean="0"/>
-              <a:t>Own</a:t>
-            </a:r>
-            <a:r>
-              <a:rPr lang="de-DE" dirty="0" smtClean="0"/>
-              <a:t> </a:t>
-            </a:r>
-            <a:r>
-              <a:rPr lang="de-DE" dirty="0" err="1" smtClean="0"/>
-              <a:t>models</a:t>
-            </a:r>
-            <a:r>
-              <a:rPr lang="de-DE" dirty="0" smtClean="0"/>
-              <a:t> </a:t>
-            </a:r>
-            <a:r>
-              <a:rPr lang="de-DE" dirty="0" err="1" smtClean="0"/>
-              <a:t>and</a:t>
-            </a:r>
-            <a:r>
-              <a:rPr lang="de-DE" dirty="0" smtClean="0"/>
-              <a:t> </a:t>
-            </a:r>
-            <a:r>
-              <a:rPr lang="de-DE" dirty="0" err="1" smtClean="0"/>
-              <a:t>models</a:t>
-            </a:r>
-            <a:endParaRPr lang="de-DE" dirty="0" smtClean="0"/>
-          </a:p>
-          <a:p>
-            <a:r>
-              <a:rPr lang="de-DE" dirty="0" err="1" smtClean="0"/>
-              <a:t>from</a:t>
-            </a:r>
-            <a:r>
-              <a:rPr lang="de-DE" dirty="0" smtClean="0"/>
-              <a:t> </a:t>
-            </a:r>
-            <a:r>
-              <a:rPr lang="de-DE" dirty="0" err="1" smtClean="0"/>
-              <a:t>literature</a:t>
-            </a:r>
-            <a:endParaRPr lang="de-DE" dirty="0"/>
-          </a:p>
-        </p:txBody>
-      </p:sp>
     </p:spTree>
     <p:extLst>
       <p:ext uri="{BB962C8B-B14F-4D97-AF65-F5344CB8AC3E}">
-        <p14:creationId xmlns:p14="http://schemas.microsoft.com/office/powerpoint/2010/main" val="3770549837"/>
+        <p14:creationId xmlns:p14="http://schemas.microsoft.com/office/powerpoint/2010/main" val="268455832"/>
       </p:ext>
     </p:extLst>
   </p:cSld>
@@ -4651,20 +4502,8 @@
           <a:lstStyle/>
           <a:p>
             <a:r>
-              <a:rPr lang="de-DE" dirty="0" err="1" smtClean="0"/>
-              <a:t>Examples</a:t>
-            </a:r>
-            <a:r>
-              <a:rPr lang="de-DE" dirty="0" smtClean="0"/>
-              <a:t> </a:t>
-            </a:r>
-            <a:r>
-              <a:rPr lang="de-DE" dirty="0" err="1" smtClean="0"/>
-              <a:t>from</a:t>
-            </a:r>
-            <a:r>
-              <a:rPr lang="de-DE" dirty="0" smtClean="0"/>
-              <a:t> Biomodels Database</a:t>
+              <a:rPr lang="de-DE" dirty="0" smtClean="0"/>
+              <a:t>SUNDIALS</a:t>
             </a:r>
             <a:endParaRPr lang="de-DE" dirty="0"/>
           </a:p>
@@ -4688,8 +4527,8 @@
         </p:blipFill>
         <p:spPr>
           <a:xfrm>
-            <a:off x="1046700" y="1045349"/>
-            <a:ext cx="7050599" cy="2725557"/>
+            <a:off x="306000" y="1201230"/>
+            <a:ext cx="3810797" cy="2833475"/>
           </a:xfrm>
           <a:prstGeom prst="rect">
             <a:avLst/>
@@ -4711,7 +4550,7 @@
           <a:bodyPr/>
           <a:lstStyle/>
           <a:p>
-            <a:endParaRPr lang="de-DE"/>
+            <a:endParaRPr lang="de-DE" dirty="0"/>
           </a:p>
         </p:txBody>
       </p:sp>
@@ -4734,6 +4573,497 @@
               <a:rPr lang="de-DE" smtClean="0"/>
               <a:pPr/>
               <a:t>7</a:t>
+            </a:fld>
+            <a:r>
+              <a:rPr lang="de-DE" smtClean="0"/>
+              <a:t> </a:t>
+            </a:r>
+            <a:r>
+              <a:rPr lang="en-US" smtClean="0">
+                <a:cs typeface="Calibri" pitchFamily="34" charset="0"/>
+              </a:rPr>
+              <a:t>· </a:t>
+            </a:r>
+            <a:fld id="{E704AA1B-59C1-4CB8-80D9-33E6DD8EDA64}" type="datetime4">
+              <a:rPr lang="de-DE" smtClean="0">
+                <a:cs typeface="Calibri" pitchFamily="34" charset="0"/>
+              </a:rPr>
+              <a:pPr/>
+              <a:t>3. November 2020</a:t>
+            </a:fld>
+            <a:endParaRPr lang="de-DE" dirty="0"/>
+          </a:p>
+        </p:txBody>
+      </p:sp>
+      <p:pic>
+        <p:nvPicPr>
+          <p:cNvPr id="7" name="Grafik 6"/>
+          <p:cNvPicPr>
+            <a:picLocks noChangeAspect="1"/>
+          </p:cNvPicPr>
+          <p:nvPr/>
+        </p:nvPicPr>
+        <p:blipFill>
+          <a:blip r:embed="rId3"/>
+          <a:stretch>
+            <a:fillRect/>
+          </a:stretch>
+        </p:blipFill>
+        <p:spPr>
+          <a:xfrm>
+            <a:off x="4025389" y="2370463"/>
+            <a:ext cx="4647128" cy="3729054"/>
+          </a:xfrm>
+          <a:prstGeom prst="rect">
+            <a:avLst/>
+          </a:prstGeom>
+        </p:spPr>
+      </p:pic>
+    </p:spTree>
+    <p:extLst>
+      <p:ext uri="{BB962C8B-B14F-4D97-AF65-F5344CB8AC3E}">
+        <p14:creationId xmlns:p14="http://schemas.microsoft.com/office/powerpoint/2010/main" val="455775699"/>
+      </p:ext>
+    </p:extLst>
+  </p:cSld>
+  <p:clrMapOvr>
+    <a:masterClrMapping/>
+  </p:clrMapOvr>
+</p:sld>
+</file>
+
+<file path=ppt/slides/slide8.xml><?xml version="1.0" encoding="utf-8"?>
+<p:sld xmlns:a="http://schemas.openxmlformats.org/drawingml/2006/main" xmlns:r="http://schemas.openxmlformats.org/officeDocument/2006/relationships" xmlns:p="http://schemas.openxmlformats.org/presentationml/2006/main">
+  <p:cSld>
+    <p:spTree>
+      <p:nvGrpSpPr>
+        <p:cNvPr id="1" name=""/>
+        <p:cNvGrpSpPr/>
+        <p:nvPr/>
+      </p:nvGrpSpPr>
+      <p:grpSpPr>
+        <a:xfrm>
+          <a:off x="0" y="0"/>
+          <a:ext cx="0" cy="0"/>
+          <a:chOff x="0" y="0"/>
+          <a:chExt cx="0" cy="0"/>
+        </a:xfrm>
+      </p:grpSpPr>
+      <p:sp>
+        <p:nvSpPr>
+          <p:cNvPr id="2" name="Titel 1"/>
+          <p:cNvSpPr>
+            <a:spLocks noGrp="1"/>
+          </p:cNvSpPr>
+          <p:nvPr>
+            <p:ph type="title"/>
+          </p:nvPr>
+        </p:nvSpPr>
+        <p:spPr/>
+        <p:txBody>
+          <a:bodyPr/>
+          <a:lstStyle/>
+          <a:p>
+            <a:r>
+              <a:rPr lang="de-DE" dirty="0" err="1" smtClean="0"/>
+              <a:t>Example</a:t>
+            </a:r>
+            <a:r>
+              <a:rPr lang="de-DE" dirty="0"/>
+              <a:t> </a:t>
+            </a:r>
+            <a:r>
+              <a:rPr lang="de-DE" dirty="0" err="1" smtClean="0"/>
+              <a:t>models</a:t>
+            </a:r>
+            <a:endParaRPr lang="de-DE" dirty="0"/>
+          </a:p>
+        </p:txBody>
+      </p:sp>
+      <p:sp>
+        <p:nvSpPr>
+          <p:cNvPr id="4" name="Textplatzhalter 3"/>
+          <p:cNvSpPr>
+            <a:spLocks noGrp="1"/>
+          </p:cNvSpPr>
+          <p:nvPr>
+            <p:ph type="body" sz="quarter" idx="12"/>
+          </p:nvPr>
+        </p:nvSpPr>
+        <p:spPr/>
+        <p:txBody>
+          <a:bodyPr/>
+          <a:lstStyle/>
+          <a:p>
+            <a:r>
+              <a:rPr lang="de-DE" dirty="0" smtClean="0"/>
+              <a:t>d2d\arFramework3\</a:t>
+            </a:r>
+            <a:r>
+              <a:rPr lang="de-DE" dirty="0" err="1" smtClean="0"/>
+              <a:t>Examples</a:t>
+            </a:r>
+            <a:endParaRPr lang="de-DE" dirty="0"/>
+          </a:p>
+        </p:txBody>
+      </p:sp>
+      <p:sp>
+        <p:nvSpPr>
+          <p:cNvPr id="5" name="Foliennummernplatzhalter 4"/>
+          <p:cNvSpPr>
+            <a:spLocks noGrp="1"/>
+          </p:cNvSpPr>
+          <p:nvPr>
+            <p:ph type="sldNum" sz="quarter" idx="4"/>
+          </p:nvPr>
+        </p:nvSpPr>
+        <p:spPr/>
+        <p:txBody>
+          <a:bodyPr/>
+          <a:lstStyle/>
+          <a:p>
+            <a:fld id="{EDCDEEE8-3B55-4518-8B2A-6D53AA778E82}" type="slidenum">
+              <a:rPr lang="de-DE" smtClean="0"/>
+              <a:pPr/>
+              <a:t>8</a:t>
+            </a:fld>
+            <a:r>
+              <a:rPr lang="de-DE" smtClean="0"/>
+              <a:t> </a:t>
+            </a:r>
+            <a:r>
+              <a:rPr lang="en-US" smtClean="0">
+                <a:cs typeface="Calibri" pitchFamily="34" charset="0"/>
+              </a:rPr>
+              <a:t>· </a:t>
+            </a:r>
+            <a:fld id="{E704AA1B-59C1-4CB8-80D9-33E6DD8EDA64}" type="datetime4">
+              <a:rPr lang="de-DE" smtClean="0">
+                <a:cs typeface="Calibri" pitchFamily="34" charset="0"/>
+              </a:rPr>
+              <a:pPr/>
+              <a:t>3. November 2020</a:t>
+            </a:fld>
+            <a:endParaRPr lang="de-DE" dirty="0"/>
+          </a:p>
+        </p:txBody>
+      </p:sp>
+      <p:pic>
+        <p:nvPicPr>
+          <p:cNvPr id="7" name="Inhaltsplatzhalter 6"/>
+          <p:cNvPicPr>
+            <a:picLocks noGrp="1" noChangeAspect="1"/>
+          </p:cNvPicPr>
+          <p:nvPr>
+            <p:ph idx="1"/>
+          </p:nvPr>
+        </p:nvPicPr>
+        <p:blipFill rotWithShape="1">
+          <a:blip r:embed="rId2"/>
+          <a:srcRect r="26176" b="15204"/>
+          <a:stretch/>
+        </p:blipFill>
+        <p:spPr>
+          <a:xfrm>
+            <a:off x="306000" y="1192214"/>
+            <a:ext cx="3854762" cy="4256480"/>
+          </a:xfrm>
+          <a:prstGeom prst="rect">
+            <a:avLst/>
+          </a:prstGeom>
+        </p:spPr>
+      </p:pic>
+      <p:pic>
+        <p:nvPicPr>
+          <p:cNvPr id="8" name="Grafik 7"/>
+          <p:cNvPicPr>
+            <a:picLocks noChangeAspect="1"/>
+          </p:cNvPicPr>
+          <p:nvPr/>
+        </p:nvPicPr>
+        <p:blipFill>
+          <a:blip r:embed="rId3"/>
+          <a:stretch>
+            <a:fillRect/>
+          </a:stretch>
+        </p:blipFill>
+        <p:spPr>
+          <a:xfrm>
+            <a:off x="3771313" y="2934987"/>
+            <a:ext cx="5247350" cy="3373007"/>
+          </a:xfrm>
+          <a:prstGeom prst="rect">
+            <a:avLst/>
+          </a:prstGeom>
+        </p:spPr>
+      </p:pic>
+      <p:pic>
+        <p:nvPicPr>
+          <p:cNvPr id="9" name="Grafik 8"/>
+          <p:cNvPicPr>
+            <a:picLocks noChangeAspect="1"/>
+          </p:cNvPicPr>
+          <p:nvPr/>
+        </p:nvPicPr>
+        <p:blipFill>
+          <a:blip r:embed="rId4"/>
+          <a:stretch>
+            <a:fillRect/>
+          </a:stretch>
+        </p:blipFill>
+        <p:spPr>
+          <a:xfrm>
+            <a:off x="4337282" y="139795"/>
+            <a:ext cx="4378616" cy="2425209"/>
+          </a:xfrm>
+          <a:prstGeom prst="rect">
+            <a:avLst/>
+          </a:prstGeom>
+          <a:ln>
+            <a:solidFill>
+              <a:schemeClr val="tx1">
+                <a:lumMod val="50000"/>
+              </a:schemeClr>
+            </a:solidFill>
+          </a:ln>
+        </p:spPr>
+      </p:pic>
+      <p:cxnSp>
+        <p:nvCxnSpPr>
+          <p:cNvPr id="11" name="Gerade Verbindung mit Pfeil 10"/>
+          <p:cNvCxnSpPr/>
+          <p:nvPr/>
+        </p:nvCxnSpPr>
+        <p:spPr>
+          <a:xfrm flipH="1">
+            <a:off x="2181981" y="1359505"/>
+            <a:ext cx="2155301" cy="1205499"/>
+          </a:xfrm>
+          <a:prstGeom prst="straightConnector1">
+            <a:avLst/>
+          </a:prstGeom>
+          <a:ln w="28575">
+            <a:solidFill>
+              <a:schemeClr val="tx1">
+                <a:lumMod val="50000"/>
+              </a:schemeClr>
+            </a:solidFill>
+            <a:tailEnd type="triangle"/>
+          </a:ln>
+        </p:spPr>
+        <p:style>
+          <a:lnRef idx="1">
+            <a:schemeClr val="accent1"/>
+          </a:lnRef>
+          <a:fillRef idx="0">
+            <a:schemeClr val="accent1"/>
+          </a:fillRef>
+          <a:effectRef idx="0">
+            <a:schemeClr val="accent1"/>
+          </a:effectRef>
+          <a:fontRef idx="minor">
+            <a:schemeClr val="tx1"/>
+          </a:fontRef>
+        </p:style>
+      </p:cxnSp>
+      <p:sp>
+        <p:nvSpPr>
+          <p:cNvPr id="12" name="Textfeld 11"/>
+          <p:cNvSpPr txBox="1"/>
+          <p:nvPr/>
+        </p:nvSpPr>
+        <p:spPr>
+          <a:xfrm>
+            <a:off x="304800" y="5583162"/>
+            <a:ext cx="2723823" cy="646331"/>
+          </a:xfrm>
+          <a:prstGeom prst="rect">
+            <a:avLst/>
+          </a:prstGeom>
+          <a:noFill/>
+        </p:spPr>
+        <p:txBody>
+          <a:bodyPr wrap="none" rtlCol="0">
+            <a:spAutoFit/>
+          </a:bodyPr>
+          <a:lstStyle/>
+          <a:p>
+            <a:r>
+              <a:rPr lang="de-DE" dirty="0" err="1" smtClean="0"/>
+              <a:t>Own</a:t>
+            </a:r>
+            <a:r>
+              <a:rPr lang="de-DE" dirty="0" smtClean="0"/>
+              <a:t> </a:t>
+            </a:r>
+            <a:r>
+              <a:rPr lang="de-DE" dirty="0" err="1" smtClean="0"/>
+              <a:t>models</a:t>
+            </a:r>
+            <a:r>
+              <a:rPr lang="de-DE" dirty="0" smtClean="0"/>
+              <a:t> </a:t>
+            </a:r>
+            <a:r>
+              <a:rPr lang="de-DE" dirty="0" err="1" smtClean="0"/>
+              <a:t>and</a:t>
+            </a:r>
+            <a:r>
+              <a:rPr lang="de-DE" dirty="0" smtClean="0"/>
+              <a:t> </a:t>
+            </a:r>
+            <a:r>
+              <a:rPr lang="de-DE" dirty="0" err="1" smtClean="0"/>
+              <a:t>models</a:t>
+            </a:r>
+            <a:endParaRPr lang="de-DE" dirty="0" smtClean="0"/>
+          </a:p>
+          <a:p>
+            <a:r>
+              <a:rPr lang="de-DE" dirty="0" err="1" smtClean="0"/>
+              <a:t>from</a:t>
+            </a:r>
+            <a:r>
+              <a:rPr lang="de-DE" dirty="0" smtClean="0"/>
+              <a:t> </a:t>
+            </a:r>
+            <a:r>
+              <a:rPr lang="de-DE" dirty="0" err="1" smtClean="0"/>
+              <a:t>literature</a:t>
+            </a:r>
+            <a:endParaRPr lang="de-DE" dirty="0"/>
+          </a:p>
+        </p:txBody>
+      </p:sp>
+    </p:spTree>
+    <p:extLst>
+      <p:ext uri="{BB962C8B-B14F-4D97-AF65-F5344CB8AC3E}">
+        <p14:creationId xmlns:p14="http://schemas.microsoft.com/office/powerpoint/2010/main" val="3770549837"/>
+      </p:ext>
+    </p:extLst>
+  </p:cSld>
+  <p:clrMapOvr>
+    <a:masterClrMapping/>
+  </p:clrMapOvr>
+</p:sld>
+</file>
+
+<file path=ppt/slides/slide9.xml><?xml version="1.0" encoding="utf-8"?>
+<p:sld xmlns:a="http://schemas.openxmlformats.org/drawingml/2006/main" xmlns:r="http://schemas.openxmlformats.org/officeDocument/2006/relationships" xmlns:p="http://schemas.openxmlformats.org/presentationml/2006/main">
+  <p:cSld>
+    <p:spTree>
+      <p:nvGrpSpPr>
+        <p:cNvPr id="1" name=""/>
+        <p:cNvGrpSpPr/>
+        <p:nvPr/>
+      </p:nvGrpSpPr>
+      <p:grpSpPr>
+        <a:xfrm>
+          <a:off x="0" y="0"/>
+          <a:ext cx="0" cy="0"/>
+          <a:chOff x="0" y="0"/>
+          <a:chExt cx="0" cy="0"/>
+        </a:xfrm>
+      </p:grpSpPr>
+      <p:sp>
+        <p:nvSpPr>
+          <p:cNvPr id="2" name="Titel 1"/>
+          <p:cNvSpPr>
+            <a:spLocks noGrp="1"/>
+          </p:cNvSpPr>
+          <p:nvPr>
+            <p:ph type="title"/>
+          </p:nvPr>
+        </p:nvSpPr>
+        <p:spPr/>
+        <p:txBody>
+          <a:bodyPr/>
+          <a:lstStyle/>
+          <a:p>
+            <a:r>
+              <a:rPr lang="de-DE" dirty="0" err="1" smtClean="0"/>
+              <a:t>Examples</a:t>
+            </a:r>
+            <a:r>
+              <a:rPr lang="de-DE" dirty="0" smtClean="0"/>
+              <a:t> </a:t>
+            </a:r>
+            <a:r>
+              <a:rPr lang="de-DE" dirty="0" err="1" smtClean="0"/>
+              <a:t>from</a:t>
+            </a:r>
+            <a:r>
+              <a:rPr lang="de-DE" dirty="0" smtClean="0"/>
+              <a:t> Biomodels Database</a:t>
+            </a:r>
+            <a:endParaRPr lang="de-DE" dirty="0"/>
+          </a:p>
+        </p:txBody>
+      </p:sp>
+      <p:pic>
+        <p:nvPicPr>
+          <p:cNvPr id="6" name="Inhaltsplatzhalter 5"/>
+          <p:cNvPicPr>
+            <a:picLocks noGrp="1" noChangeAspect="1"/>
+          </p:cNvPicPr>
+          <p:nvPr>
+            <p:ph idx="1"/>
+          </p:nvPr>
+        </p:nvPicPr>
+        <p:blipFill>
+          <a:blip r:embed="rId2"/>
+          <a:stretch>
+            <a:fillRect/>
+          </a:stretch>
+        </p:blipFill>
+        <p:spPr>
+          <a:xfrm>
+            <a:off x="1046700" y="1045349"/>
+            <a:ext cx="7050599" cy="2725557"/>
+          </a:xfrm>
+          <a:prstGeom prst="rect">
+            <a:avLst/>
+          </a:prstGeom>
+        </p:spPr>
+      </p:pic>
+      <p:sp>
+        <p:nvSpPr>
+          <p:cNvPr id="4" name="Textplatzhalter 3"/>
+          <p:cNvSpPr>
+            <a:spLocks noGrp="1"/>
+          </p:cNvSpPr>
+          <p:nvPr>
+            <p:ph type="body" sz="quarter" idx="12"/>
+          </p:nvPr>
+        </p:nvSpPr>
+        <p:spPr/>
+        <p:txBody>
+          <a:bodyPr/>
+          <a:lstStyle/>
+          <a:p>
+            <a:endParaRPr lang="de-DE"/>
+          </a:p>
+        </p:txBody>
+      </p:sp>
+      <p:sp>
+        <p:nvSpPr>
+          <p:cNvPr id="5" name="Foliennummernplatzhalter 4"/>
+          <p:cNvSpPr>
+            <a:spLocks noGrp="1"/>
+          </p:cNvSpPr>
+          <p:nvPr>
+            <p:ph type="sldNum" sz="quarter" idx="4"/>
+          </p:nvPr>
+        </p:nvSpPr>
+        <p:spPr/>
+        <p:txBody>
+          <a:bodyPr/>
+          <a:lstStyle/>
+          <a:p>
+            <a:fld id="{EDCDEEE8-3B55-4518-8B2A-6D53AA778E82}" type="slidenum">
+              <a:rPr lang="de-DE" smtClean="0"/>
+              <a:pPr/>
+              <a:t>9</a:t>
             </a:fld>
             <a:r>
               <a:rPr lang="de-DE" smtClean="0"/>

</xml_diff>